<commit_message>
Added 8 Lights and new table to picture
</commit_message>
<xml_diff>
--- a/papers/journalSwarmControl/pictures/pdf/SetUp.pptx
+++ b/papers/journalSwarmControl/pictures/pdf/SetUp.pptx
@@ -288,7 +288,7 @@
           <a:p>
             <a:fld id="{F694978D-A894-E24D-9868-C9A03761E7E6}" type="datetimeFigureOut">
               <a:rPr lang="en-US" smtClean="0"/>
-              <a:t>3/28/16</a:t>
+              <a:t>7/28/2016</a:t>
             </a:fld>
             <a:endParaRPr lang="en-US"/>
           </a:p>
@@ -458,7 +458,7 @@
           <a:p>
             <a:fld id="{F694978D-A894-E24D-9868-C9A03761E7E6}" type="datetimeFigureOut">
               <a:rPr lang="en-US" smtClean="0"/>
-              <a:t>3/28/16</a:t>
+              <a:t>7/28/2016</a:t>
             </a:fld>
             <a:endParaRPr lang="en-US"/>
           </a:p>
@@ -638,7 +638,7 @@
           <a:p>
             <a:fld id="{F694978D-A894-E24D-9868-C9A03761E7E6}" type="datetimeFigureOut">
               <a:rPr lang="en-US" smtClean="0"/>
-              <a:t>3/28/16</a:t>
+              <a:t>7/28/2016</a:t>
             </a:fld>
             <a:endParaRPr lang="en-US"/>
           </a:p>
@@ -808,7 +808,7 @@
           <a:p>
             <a:fld id="{F694978D-A894-E24D-9868-C9A03761E7E6}" type="datetimeFigureOut">
               <a:rPr lang="en-US" smtClean="0"/>
-              <a:t>3/28/16</a:t>
+              <a:t>7/28/2016</a:t>
             </a:fld>
             <a:endParaRPr lang="en-US"/>
           </a:p>
@@ -1054,7 +1054,7 @@
           <a:p>
             <a:fld id="{F694978D-A894-E24D-9868-C9A03761E7E6}" type="datetimeFigureOut">
               <a:rPr lang="en-US" smtClean="0"/>
-              <a:t>3/28/16</a:t>
+              <a:t>7/28/2016</a:t>
             </a:fld>
             <a:endParaRPr lang="en-US"/>
           </a:p>
@@ -1342,7 +1342,7 @@
           <a:p>
             <a:fld id="{F694978D-A894-E24D-9868-C9A03761E7E6}" type="datetimeFigureOut">
               <a:rPr lang="en-US" smtClean="0"/>
-              <a:t>3/28/16</a:t>
+              <a:t>7/28/2016</a:t>
             </a:fld>
             <a:endParaRPr lang="en-US"/>
           </a:p>
@@ -1764,7 +1764,7 @@
           <a:p>
             <a:fld id="{F694978D-A894-E24D-9868-C9A03761E7E6}" type="datetimeFigureOut">
               <a:rPr lang="en-US" smtClean="0"/>
-              <a:t>3/28/16</a:t>
+              <a:t>7/28/2016</a:t>
             </a:fld>
             <a:endParaRPr lang="en-US"/>
           </a:p>
@@ -1882,7 +1882,7 @@
           <a:p>
             <a:fld id="{F694978D-A894-E24D-9868-C9A03761E7E6}" type="datetimeFigureOut">
               <a:rPr lang="en-US" smtClean="0"/>
-              <a:t>3/28/16</a:t>
+              <a:t>7/28/2016</a:t>
             </a:fld>
             <a:endParaRPr lang="en-US"/>
           </a:p>
@@ -1977,7 +1977,7 @@
           <a:p>
             <a:fld id="{F694978D-A894-E24D-9868-C9A03761E7E6}" type="datetimeFigureOut">
               <a:rPr lang="en-US" smtClean="0"/>
-              <a:t>3/28/16</a:t>
+              <a:t>7/28/2016</a:t>
             </a:fld>
             <a:endParaRPr lang="en-US"/>
           </a:p>
@@ -2254,7 +2254,7 @@
           <a:p>
             <a:fld id="{F694978D-A894-E24D-9868-C9A03761E7E6}" type="datetimeFigureOut">
               <a:rPr lang="en-US" smtClean="0"/>
-              <a:t>3/28/16</a:t>
+              <a:t>7/28/2016</a:t>
             </a:fld>
             <a:endParaRPr lang="en-US"/>
           </a:p>
@@ -2507,7 +2507,7 @@
           <a:p>
             <a:fld id="{F694978D-A894-E24D-9868-C9A03761E7E6}" type="datetimeFigureOut">
               <a:rPr lang="en-US" smtClean="0"/>
-              <a:t>3/28/16</a:t>
+              <a:t>7/28/2016</a:t>
             </a:fld>
             <a:endParaRPr lang="en-US"/>
           </a:p>
@@ -2720,7 +2720,7 @@
           <a:p>
             <a:fld id="{F694978D-A894-E24D-9868-C9A03761E7E6}" type="datetimeFigureOut">
               <a:rPr lang="en-US" smtClean="0"/>
-              <a:t>3/28/16</a:t>
+              <a:t>7/28/2016</a:t>
             </a:fld>
             <a:endParaRPr lang="en-US"/>
           </a:p>
@@ -3097,16 +3097,14 @@
       </p:grpSpPr>
       <p:cxnSp>
         <p:nvCxnSpPr>
-          <p:cNvPr id="57" name="Straight Arrow Connector 56"/>
-          <p:cNvCxnSpPr>
-            <a:stCxn id="58" idx="2"/>
-          </p:cNvCxnSpPr>
+          <p:cNvPr id="61" name="Straight Arrow Connector 60"/>
+          <p:cNvCxnSpPr/>
           <p:nvPr/>
         </p:nvCxnSpPr>
         <p:spPr>
-          <a:xfrm flipH="1">
-            <a:off x="1028422" y="1568758"/>
-            <a:ext cx="1112261" cy="0"/>
+          <a:xfrm>
+            <a:off x="1768780" y="708190"/>
+            <a:ext cx="887432" cy="54841"/>
           </a:xfrm>
           <a:prstGeom prst="straightConnector1">
             <a:avLst/>
@@ -3135,19 +3133,22 @@
       </p:cxnSp>
       <p:sp>
         <p:nvSpPr>
-          <p:cNvPr id="58" name="TextBox 57"/>
+          <p:cNvPr id="62" name="TextBox 61"/>
           <p:cNvSpPr txBox="1"/>
           <p:nvPr/>
         </p:nvSpPr>
         <p:spPr>
           <a:xfrm>
-            <a:off x="1112262" y="1199426"/>
-            <a:ext cx="2056841" cy="369332"/>
+            <a:off x="762642" y="338858"/>
+            <a:ext cx="1609492" cy="369332"/>
           </a:xfrm>
           <a:prstGeom prst="rect">
             <a:avLst/>
           </a:prstGeom>
           <a:noFill/>
+          <a:ln>
+            <a:noFill/>
+          </a:ln>
         </p:spPr>
         <p:txBody>
           <a:bodyPr wrap="square" rtlCol="0">
@@ -3155,12 +3156,13 @@
           </a:bodyPr>
           <a:lstStyle/>
           <a:p>
+            <a:pPr algn="ctr"/>
             <a:r>
               <a:rPr lang="en-US" dirty="0" smtClean="0">
                 <a:latin typeface="Times New Roman"/>
                 <a:cs typeface="Times New Roman"/>
               </a:rPr>
-              <a:t>30W LED Light</a:t>
+              <a:t>Vision System</a:t>
             </a:r>
             <a:endParaRPr lang="en-US" dirty="0">
               <a:latin typeface="Times New Roman"/>
@@ -3169,54 +3171,431 @@
           </a:p>
         </p:txBody>
       </p:sp>
-      <p:sp>
-        <p:nvSpPr>
-          <p:cNvPr id="59" name="TextBox 58"/>
-          <p:cNvSpPr txBox="1"/>
+      <p:grpSp>
+        <p:nvGrpSpPr>
+          <p:cNvPr id="19" name="Group 18"/>
+          <p:cNvGrpSpPr/>
+          <p:nvPr/>
+        </p:nvGrpSpPr>
+        <p:grpSpPr>
+          <a:xfrm>
+            <a:off x="5431478" y="2460341"/>
+            <a:ext cx="2266729" cy="3131684"/>
+            <a:chOff x="5234764" y="2542349"/>
+            <a:chExt cx="2266729" cy="3131684"/>
+          </a:xfrm>
+        </p:grpSpPr>
+        <p:sp>
+          <p:nvSpPr>
+            <p:cNvPr id="68" name="TextBox 67"/>
+            <p:cNvSpPr txBox="1"/>
+            <p:nvPr/>
+          </p:nvSpPr>
+          <p:spPr>
+            <a:xfrm>
+              <a:off x="6025582" y="5304701"/>
+              <a:ext cx="855351" cy="369332"/>
+            </a:xfrm>
+            <a:prstGeom prst="rect">
+              <a:avLst/>
+            </a:prstGeom>
+            <a:noFill/>
+          </p:spPr>
+          <p:txBody>
+            <a:bodyPr wrap="square" rtlCol="0">
+              <a:spAutoFit/>
+            </a:bodyPr>
+            <a:lstStyle/>
+            <a:p>
+              <a:r>
+                <a:rPr lang="en-US" dirty="0" smtClean="0">
+                  <a:latin typeface="Times"/>
+                  <a:cs typeface="Times"/>
+                </a:rPr>
+                <a:t>3 cm</a:t>
+              </a:r>
+              <a:endParaRPr lang="en-US" dirty="0">
+                <a:latin typeface="Times"/>
+                <a:cs typeface="Times"/>
+              </a:endParaRPr>
+            </a:p>
+          </p:txBody>
+        </p:sp>
+        <p:pic>
+          <p:nvPicPr>
+            <p:cNvPr id="75" name="Picture 74" descr="Kilobot.png"/>
+            <p:cNvPicPr>
+              <a:picLocks noChangeAspect="1"/>
+            </p:cNvPicPr>
+            <p:nvPr/>
+          </p:nvPicPr>
+          <p:blipFill>
+            <a:blip r:embed="rId2" cstate="screen">
+              <a:extLst>
+                <a:ext uri="{28A0092B-C50C-407E-A947-70E740481C1C}">
+                  <a14:useLocalDpi xmlns:a14="http://schemas.microsoft.com/office/drawing/2010/main"/>
+                </a:ext>
+              </a:extLst>
+            </a:blip>
+            <a:stretch>
+              <a:fillRect/>
+            </a:stretch>
+          </p:blipFill>
+          <p:spPr>
+            <a:xfrm>
+              <a:off x="5234764" y="2542349"/>
+              <a:ext cx="2266729" cy="2902785"/>
+            </a:xfrm>
+            <a:prstGeom prst="rect">
+              <a:avLst/>
+            </a:prstGeom>
+          </p:spPr>
+        </p:pic>
+        <p:cxnSp>
+          <p:nvCxnSpPr>
+            <p:cNvPr id="32" name="Straight Arrow Connector 31"/>
+            <p:cNvCxnSpPr/>
+            <p:nvPr/>
+          </p:nvCxnSpPr>
+          <p:spPr>
+            <a:xfrm flipV="1">
+              <a:off x="5610023" y="5268311"/>
+              <a:ext cx="1604938" cy="5056"/>
+            </a:xfrm>
+            <a:prstGeom prst="straightConnector1">
+              <a:avLst/>
+            </a:prstGeom>
+            <a:ln>
+              <a:solidFill>
+                <a:srgbClr val="FF0000"/>
+              </a:solidFill>
+              <a:headEnd type="arrow"/>
+              <a:tailEnd type="arrow"/>
+            </a:ln>
+          </p:spPr>
+          <p:style>
+            <a:lnRef idx="2">
+              <a:schemeClr val="accent1"/>
+            </a:lnRef>
+            <a:fillRef idx="0">
+              <a:schemeClr val="accent1"/>
+            </a:fillRef>
+            <a:effectRef idx="1">
+              <a:schemeClr val="accent1"/>
+            </a:effectRef>
+            <a:fontRef idx="minor">
+              <a:schemeClr val="tx1"/>
+            </a:fontRef>
+          </p:style>
+        </p:cxnSp>
+      </p:grpSp>
+      <p:sp>
+        <p:nvSpPr>
+          <p:cNvPr id="21" name="Cube 20"/>
+          <p:cNvSpPr/>
           <p:nvPr/>
         </p:nvSpPr>
         <p:spPr>
           <a:xfrm>
-            <a:off x="3747842" y="2500566"/>
-            <a:ext cx="2056841" cy="369332"/>
-          </a:xfrm>
-          <a:prstGeom prst="rect">
+            <a:off x="2674478" y="440140"/>
+            <a:ext cx="562155" cy="590942"/>
+          </a:xfrm>
+          <a:prstGeom prst="cube">
             <a:avLst/>
           </a:prstGeom>
-          <a:noFill/>
-        </p:spPr>
-        <p:txBody>
-          <a:bodyPr wrap="square" rtlCol="0">
-            <a:spAutoFit/>
-          </a:bodyPr>
-          <a:lstStyle/>
-          <a:p>
-            <a:r>
-              <a:rPr lang="en-US" dirty="0" smtClean="0">
-                <a:latin typeface="Times"/>
-                <a:cs typeface="Times"/>
-              </a:rPr>
-              <a:t>30W LED Light</a:t>
-            </a:r>
-            <a:endParaRPr lang="en-US" dirty="0">
-              <a:latin typeface="Times"/>
-              <a:cs typeface="Times"/>
-            </a:endParaRPr>
+        </p:spPr>
+        <p:style>
+          <a:lnRef idx="2">
+            <a:schemeClr val="dk1"/>
+          </a:lnRef>
+          <a:fillRef idx="1">
+            <a:schemeClr val="lt1"/>
+          </a:fillRef>
+          <a:effectRef idx="0">
+            <a:schemeClr val="dk1"/>
+          </a:effectRef>
+          <a:fontRef idx="minor">
+            <a:schemeClr val="dk1"/>
+          </a:fontRef>
+        </p:style>
+        <p:txBody>
+          <a:bodyPr rtlCol="0" anchor="ctr"/>
+          <a:lstStyle/>
+          <a:p>
+            <a:pPr algn="ctr"/>
+            <a:endParaRPr lang="en-US"/>
+          </a:p>
+        </p:txBody>
+      </p:sp>
+      <p:sp>
+        <p:nvSpPr>
+          <p:cNvPr id="25" name="Trapezoid 24"/>
+          <p:cNvSpPr/>
+          <p:nvPr/>
+        </p:nvSpPr>
+        <p:spPr>
+          <a:xfrm>
+            <a:off x="2773586" y="1031082"/>
+            <a:ext cx="354066" cy="209158"/>
+          </a:xfrm>
+          <a:prstGeom prst="trapezoid">
+            <a:avLst>
+              <a:gd name="adj" fmla="val 46252"/>
+            </a:avLst>
+          </a:prstGeom>
+        </p:spPr>
+        <p:style>
+          <a:lnRef idx="2">
+            <a:schemeClr val="dk1"/>
+          </a:lnRef>
+          <a:fillRef idx="1">
+            <a:schemeClr val="lt1"/>
+          </a:fillRef>
+          <a:effectRef idx="0">
+            <a:schemeClr val="dk1"/>
+          </a:effectRef>
+          <a:fontRef idx="minor">
+            <a:schemeClr val="dk1"/>
+          </a:fontRef>
+        </p:style>
+        <p:txBody>
+          <a:bodyPr rtlCol="0" anchor="ctr"/>
+          <a:lstStyle/>
+          <a:p>
+            <a:pPr algn="ctr"/>
+            <a:endParaRPr lang="en-US"/>
+          </a:p>
+        </p:txBody>
+      </p:sp>
+      <p:sp>
+        <p:nvSpPr>
+          <p:cNvPr id="31" name="Trapezoid 30"/>
+          <p:cNvSpPr/>
+          <p:nvPr/>
+        </p:nvSpPr>
+        <p:spPr>
+          <a:xfrm rot="3582198">
+            <a:off x="3490212" y="2366957"/>
+            <a:ext cx="367582" cy="544348"/>
+          </a:xfrm>
+          <a:prstGeom prst="trapezoid">
+            <a:avLst>
+              <a:gd name="adj" fmla="val 29569"/>
+            </a:avLst>
+          </a:prstGeom>
+          <a:solidFill>
+            <a:srgbClr val="FFCC66"/>
+          </a:solidFill>
+          <a:ln>
+            <a:noFill/>
+          </a:ln>
+          <a:effectLst/>
+        </p:spPr>
+        <p:style>
+          <a:lnRef idx="1">
+            <a:schemeClr val="accent1"/>
+          </a:lnRef>
+          <a:fillRef idx="3">
+            <a:schemeClr val="accent1"/>
+          </a:fillRef>
+          <a:effectRef idx="2">
+            <a:schemeClr val="accent1"/>
+          </a:effectRef>
+          <a:fontRef idx="minor">
+            <a:schemeClr val="lt1"/>
+          </a:fontRef>
+        </p:style>
+        <p:txBody>
+          <a:bodyPr rtlCol="0" anchor="ctr"/>
+          <a:lstStyle/>
+          <a:p>
+            <a:pPr algn="ctr"/>
+            <a:endParaRPr lang="en-US"/>
+          </a:p>
+        </p:txBody>
+      </p:sp>
+      <p:sp>
+        <p:nvSpPr>
+          <p:cNvPr id="79" name="Trapezoid 78"/>
+          <p:cNvSpPr/>
+          <p:nvPr/>
+        </p:nvSpPr>
+        <p:spPr>
+          <a:xfrm rot="19375798">
+            <a:off x="4679008" y="2649416"/>
+            <a:ext cx="367582" cy="544348"/>
+          </a:xfrm>
+          <a:prstGeom prst="trapezoid">
+            <a:avLst>
+              <a:gd name="adj" fmla="val 29569"/>
+            </a:avLst>
+          </a:prstGeom>
+          <a:solidFill>
+            <a:srgbClr val="FFCC66"/>
+          </a:solidFill>
+          <a:ln>
+            <a:noFill/>
+          </a:ln>
+          <a:effectLst/>
+        </p:spPr>
+        <p:style>
+          <a:lnRef idx="1">
+            <a:schemeClr val="accent1"/>
+          </a:lnRef>
+          <a:fillRef idx="3">
+            <a:schemeClr val="accent1"/>
+          </a:fillRef>
+          <a:effectRef idx="2">
+            <a:schemeClr val="accent1"/>
+          </a:effectRef>
+          <a:fontRef idx="minor">
+            <a:schemeClr val="lt1"/>
+          </a:fontRef>
+        </p:style>
+        <p:txBody>
+          <a:bodyPr rtlCol="0" anchor="ctr"/>
+          <a:lstStyle/>
+          <a:p>
+            <a:pPr algn="ctr"/>
+            <a:endParaRPr lang="en-US"/>
+          </a:p>
+        </p:txBody>
+      </p:sp>
+      <p:sp>
+        <p:nvSpPr>
+          <p:cNvPr id="80" name="Trapezoid 79"/>
+          <p:cNvSpPr/>
+          <p:nvPr/>
+        </p:nvSpPr>
+        <p:spPr>
+          <a:xfrm rot="287208">
+            <a:off x="4008973" y="2621625"/>
+            <a:ext cx="367582" cy="544348"/>
+          </a:xfrm>
+          <a:prstGeom prst="trapezoid">
+            <a:avLst>
+              <a:gd name="adj" fmla="val 29569"/>
+            </a:avLst>
+          </a:prstGeom>
+          <a:solidFill>
+            <a:srgbClr val="FFCC66"/>
+          </a:solidFill>
+          <a:ln>
+            <a:noFill/>
+          </a:ln>
+          <a:effectLst/>
+        </p:spPr>
+        <p:style>
+          <a:lnRef idx="1">
+            <a:schemeClr val="accent1"/>
+          </a:lnRef>
+          <a:fillRef idx="3">
+            <a:schemeClr val="accent1"/>
+          </a:fillRef>
+          <a:effectRef idx="2">
+            <a:schemeClr val="accent1"/>
+          </a:effectRef>
+          <a:fontRef idx="minor">
+            <a:schemeClr val="lt1"/>
+          </a:fontRef>
+        </p:style>
+        <p:txBody>
+          <a:bodyPr rtlCol="0" anchor="ctr"/>
+          <a:lstStyle/>
+          <a:p>
+            <a:pPr algn="ctr"/>
+            <a:endParaRPr lang="en-US"/>
+          </a:p>
+        </p:txBody>
+      </p:sp>
+      <p:sp>
+        <p:nvSpPr>
+          <p:cNvPr id="39" name="Trapezoid 38"/>
+          <p:cNvSpPr/>
+          <p:nvPr/>
+        </p:nvSpPr>
+        <p:spPr>
+          <a:xfrm>
+            <a:off x="2514847" y="1873989"/>
+            <a:ext cx="784455" cy="101357"/>
+          </a:xfrm>
+          <a:prstGeom prst="trapezoid">
+            <a:avLst/>
+          </a:prstGeom>
+        </p:spPr>
+        <p:style>
+          <a:lnRef idx="2">
+            <a:schemeClr val="dk1"/>
+          </a:lnRef>
+          <a:fillRef idx="1">
+            <a:schemeClr val="lt1"/>
+          </a:fillRef>
+          <a:effectRef idx="0">
+            <a:schemeClr val="dk1"/>
+          </a:effectRef>
+          <a:fontRef idx="minor">
+            <a:schemeClr val="dk1"/>
+          </a:fontRef>
+        </p:style>
+        <p:txBody>
+          <a:bodyPr rtlCol="0" anchor="ctr"/>
+          <a:lstStyle/>
+          <a:p>
+            <a:pPr algn="ctr"/>
+            <a:endParaRPr lang="en-US"/>
+          </a:p>
+        </p:txBody>
+      </p:sp>
+      <p:sp>
+        <p:nvSpPr>
+          <p:cNvPr id="81" name="Cube 80"/>
+          <p:cNvSpPr/>
+          <p:nvPr/>
+        </p:nvSpPr>
+        <p:spPr>
+          <a:xfrm>
+            <a:off x="2514847" y="1975347"/>
+            <a:ext cx="784455" cy="423456"/>
+          </a:xfrm>
+          <a:prstGeom prst="cube">
+            <a:avLst>
+              <a:gd name="adj" fmla="val 0"/>
+            </a:avLst>
+          </a:prstGeom>
+        </p:spPr>
+        <p:style>
+          <a:lnRef idx="2">
+            <a:schemeClr val="dk1"/>
+          </a:lnRef>
+          <a:fillRef idx="1">
+            <a:schemeClr val="lt1"/>
+          </a:fillRef>
+          <a:effectRef idx="0">
+            <a:schemeClr val="dk1"/>
+          </a:effectRef>
+          <a:fontRef idx="minor">
+            <a:schemeClr val="dk1"/>
+          </a:fontRef>
+        </p:style>
+        <p:txBody>
+          <a:bodyPr rtlCol="0" anchor="ctr"/>
+          <a:lstStyle/>
+          <a:p>
+            <a:pPr algn="ctr"/>
+            <a:endParaRPr lang="en-US"/>
           </a:p>
         </p:txBody>
       </p:sp>
       <p:cxnSp>
         <p:nvCxnSpPr>
-          <p:cNvPr id="60" name="Straight Arrow Connector 59"/>
-          <p:cNvCxnSpPr>
-            <a:stCxn id="59" idx="0"/>
-          </p:cNvCxnSpPr>
+          <p:cNvPr id="57" name="Straight Arrow Connector 56"/>
+          <p:cNvCxnSpPr/>
           <p:nvPr/>
         </p:nvCxnSpPr>
         <p:spPr>
-          <a:xfrm flipV="1">
-            <a:off x="4776263" y="1692073"/>
-            <a:ext cx="627112" cy="808493"/>
+          <a:xfrm flipH="1">
+            <a:off x="284231" y="1614528"/>
+            <a:ext cx="320305" cy="1027541"/>
           </a:xfrm>
           <a:prstGeom prst="straightConnector1">
             <a:avLst/>
@@ -3243,16 +3622,90 @@
           </a:fontRef>
         </p:style>
       </p:cxnSp>
+      <p:sp>
+        <p:nvSpPr>
+          <p:cNvPr id="58" name="TextBox 57"/>
+          <p:cNvSpPr txBox="1"/>
+          <p:nvPr/>
+        </p:nvSpPr>
+        <p:spPr>
+          <a:xfrm>
+            <a:off x="70722" y="1245196"/>
+            <a:ext cx="2034559" cy="369332"/>
+          </a:xfrm>
+          <a:prstGeom prst="rect">
+            <a:avLst/>
+          </a:prstGeom>
+          <a:noFill/>
+        </p:spPr>
+        <p:txBody>
+          <a:bodyPr wrap="square" rtlCol="0">
+            <a:spAutoFit/>
+          </a:bodyPr>
+          <a:lstStyle/>
+          <a:p>
+            <a:pPr algn="ctr"/>
+            <a:r>
+              <a:rPr lang="en-US" dirty="0" smtClean="0">
+                <a:latin typeface="Times New Roman"/>
+                <a:cs typeface="Times New Roman"/>
+              </a:rPr>
+              <a:t>30W LED Lights</a:t>
+            </a:r>
+            <a:endParaRPr lang="en-US" dirty="0">
+              <a:latin typeface="Times New Roman"/>
+              <a:cs typeface="Times New Roman"/>
+            </a:endParaRPr>
+          </a:p>
+        </p:txBody>
+      </p:sp>
+      <p:sp>
+        <p:nvSpPr>
+          <p:cNvPr id="59" name="TextBox 58"/>
+          <p:cNvSpPr txBox="1"/>
+          <p:nvPr/>
+        </p:nvSpPr>
+        <p:spPr>
+          <a:xfrm>
+            <a:off x="3717819" y="870908"/>
+            <a:ext cx="1813111" cy="369332"/>
+          </a:xfrm>
+          <a:prstGeom prst="rect">
+            <a:avLst/>
+          </a:prstGeom>
+          <a:noFill/>
+        </p:spPr>
+        <p:txBody>
+          <a:bodyPr wrap="square" rtlCol="0">
+            <a:spAutoFit/>
+          </a:bodyPr>
+          <a:lstStyle/>
+          <a:p>
+            <a:pPr algn="ctr"/>
+            <a:r>
+              <a:rPr lang="en-US" dirty="0" smtClean="0">
+                <a:latin typeface="Times"/>
+                <a:cs typeface="Times"/>
+              </a:rPr>
+              <a:t>30W LED Lights</a:t>
+            </a:r>
+            <a:endParaRPr lang="en-US" dirty="0">
+              <a:latin typeface="Times"/>
+              <a:cs typeface="Times"/>
+            </a:endParaRPr>
+          </a:p>
+        </p:txBody>
+      </p:sp>
       <p:cxnSp>
         <p:nvCxnSpPr>
-          <p:cNvPr id="61" name="Straight Arrow Connector 60"/>
+          <p:cNvPr id="60" name="Straight Arrow Connector 59"/>
           <p:cNvCxnSpPr/>
           <p:nvPr/>
         </p:nvCxnSpPr>
         <p:spPr>
-          <a:xfrm flipV="1">
-            <a:off x="1645473" y="375658"/>
-            <a:ext cx="990203" cy="35778"/>
+          <a:xfrm flipH="1">
+            <a:off x="3341847" y="1240240"/>
+            <a:ext cx="753694" cy="601867"/>
           </a:xfrm>
           <a:prstGeom prst="straightConnector1">
             <a:avLst/>
@@ -3281,55 +3734,92 @@
       </p:cxnSp>
       <p:sp>
         <p:nvSpPr>
-          <p:cNvPr id="62" name="TextBox 61"/>
-          <p:cNvSpPr txBox="1"/>
+          <p:cNvPr id="27" name="Cube 26"/>
+          <p:cNvSpPr/>
           <p:nvPr/>
         </p:nvSpPr>
         <p:spPr>
-          <a:xfrm>
-            <a:off x="69572" y="226769"/>
-            <a:ext cx="1987269" cy="369332"/>
-          </a:xfrm>
-          <a:prstGeom prst="rect">
+          <a:xfrm rot="565866">
+            <a:off x="3946533" y="2000108"/>
+            <a:ext cx="856791" cy="526890"/>
+          </a:xfrm>
+          <a:prstGeom prst="cube">
             <a:avLst/>
           </a:prstGeom>
-          <a:noFill/>
-          <a:ln>
-            <a:noFill/>
-          </a:ln>
-        </p:spPr>
-        <p:txBody>
-          <a:bodyPr wrap="square" rtlCol="0">
-            <a:spAutoFit/>
-          </a:bodyPr>
-          <a:lstStyle/>
-          <a:p>
-            <a:r>
-              <a:rPr lang="en-US" dirty="0" smtClean="0">
-                <a:latin typeface="Times New Roman"/>
-                <a:cs typeface="Times New Roman"/>
-              </a:rPr>
-              <a:t>Vision System</a:t>
-            </a:r>
-            <a:endParaRPr lang="en-US" dirty="0">
-              <a:latin typeface="Times New Roman"/>
-              <a:cs typeface="Times New Roman"/>
-            </a:endParaRPr>
+        </p:spPr>
+        <p:style>
+          <a:lnRef idx="2">
+            <a:schemeClr val="dk1"/>
+          </a:lnRef>
+          <a:fillRef idx="1">
+            <a:schemeClr val="lt1"/>
+          </a:fillRef>
+          <a:effectRef idx="0">
+            <a:schemeClr val="dk1"/>
+          </a:effectRef>
+          <a:fontRef idx="minor">
+            <a:schemeClr val="dk1"/>
+          </a:fontRef>
+        </p:style>
+        <p:txBody>
+          <a:bodyPr rtlCol="0" anchor="ctr"/>
+          <a:lstStyle/>
+          <a:p>
+            <a:pPr algn="ctr"/>
+            <a:endParaRPr lang="en-US"/>
+          </a:p>
+        </p:txBody>
+      </p:sp>
+      <p:sp>
+        <p:nvSpPr>
+          <p:cNvPr id="86" name="Cube 85"/>
+          <p:cNvSpPr/>
+          <p:nvPr/>
+        </p:nvSpPr>
+        <p:spPr>
+          <a:xfrm rot="20555765" flipH="1">
+            <a:off x="845666" y="2156520"/>
+            <a:ext cx="869499" cy="484568"/>
+          </a:xfrm>
+          <a:prstGeom prst="cube">
+            <a:avLst>
+              <a:gd name="adj" fmla="val 23937"/>
+            </a:avLst>
+          </a:prstGeom>
+        </p:spPr>
+        <p:style>
+          <a:lnRef idx="2">
+            <a:schemeClr val="dk1"/>
+          </a:lnRef>
+          <a:fillRef idx="1">
+            <a:schemeClr val="lt1"/>
+          </a:fillRef>
+          <a:effectRef idx="0">
+            <a:schemeClr val="dk1"/>
+          </a:effectRef>
+          <a:fontRef idx="minor">
+            <a:schemeClr val="dk1"/>
+          </a:fontRef>
+        </p:style>
+        <p:txBody>
+          <a:bodyPr rtlCol="0" anchor="ctr"/>
+          <a:lstStyle/>
+          <a:p>
+            <a:pPr algn="ctr"/>
+            <a:endParaRPr lang="en-US"/>
           </a:p>
         </p:txBody>
       </p:sp>
       <p:cxnSp>
         <p:nvCxnSpPr>
-          <p:cNvPr id="63" name="Straight Arrow Connector 62"/>
-          <p:cNvCxnSpPr>
-            <a:stCxn id="64" idx="2"/>
-          </p:cNvCxnSpPr>
+          <p:cNvPr id="87" name="Straight Arrow Connector 86"/>
+          <p:cNvCxnSpPr/>
           <p:nvPr/>
         </p:nvCxnSpPr>
         <p:spPr>
           <a:xfrm>
-            <a:off x="1441814" y="2713101"/>
-            <a:ext cx="615027" cy="1269706"/>
+            <a:off x="4685840" y="1286513"/>
+            <a:ext cx="1" cy="633749"/>
           </a:xfrm>
           <a:prstGeom prst="straightConnector1">
             <a:avLst/>
@@ -3358,59 +3848,100 @@
       </p:cxnSp>
       <p:sp>
         <p:nvSpPr>
-          <p:cNvPr id="64" name="TextBox 63"/>
-          <p:cNvSpPr txBox="1"/>
+          <p:cNvPr id="88" name="Cube 87"/>
+          <p:cNvSpPr/>
           <p:nvPr/>
         </p:nvSpPr>
         <p:spPr>
           <a:xfrm>
-            <a:off x="247952" y="2343769"/>
-            <a:ext cx="2387724" cy="369332"/>
-          </a:xfrm>
-          <a:prstGeom prst="rect">
+            <a:off x="284231" y="2938128"/>
+            <a:ext cx="320305" cy="331769"/>
+          </a:xfrm>
+          <a:prstGeom prst="cube">
+            <a:avLst>
+              <a:gd name="adj" fmla="val 0"/>
+            </a:avLst>
+          </a:prstGeom>
+        </p:spPr>
+        <p:style>
+          <a:lnRef idx="2">
+            <a:schemeClr val="dk1"/>
+          </a:lnRef>
+          <a:fillRef idx="1">
+            <a:schemeClr val="lt1"/>
+          </a:fillRef>
+          <a:effectRef idx="0">
+            <a:schemeClr val="dk1"/>
+          </a:effectRef>
+          <a:fontRef idx="minor">
+            <a:schemeClr val="dk1"/>
+          </a:fontRef>
+        </p:style>
+        <p:txBody>
+          <a:bodyPr rtlCol="0" anchor="ctr"/>
+          <a:lstStyle/>
+          <a:p>
+            <a:pPr algn="ctr"/>
+            <a:endParaRPr lang="en-US"/>
+          </a:p>
+        </p:txBody>
+      </p:sp>
+      <p:sp>
+        <p:nvSpPr>
+          <p:cNvPr id="89" name="Trapezoid 88"/>
+          <p:cNvSpPr/>
+          <p:nvPr/>
+        </p:nvSpPr>
+        <p:spPr>
+          <a:xfrm>
+            <a:off x="284231" y="2639968"/>
+            <a:ext cx="320305" cy="299621"/>
+          </a:xfrm>
+          <a:prstGeom prst="trapezoid">
             <a:avLst/>
           </a:prstGeom>
-          <a:noFill/>
-        </p:spPr>
-        <p:txBody>
-          <a:bodyPr wrap="square" rtlCol="0">
-            <a:spAutoFit/>
-          </a:bodyPr>
-          <a:lstStyle/>
-          <a:p>
-            <a:r>
-              <a:rPr lang="en-US" dirty="0" smtClean="0">
-                <a:latin typeface="Times New Roman"/>
-                <a:cs typeface="Times New Roman"/>
-              </a:rPr>
-              <a:t>Table of the robots</a:t>
-            </a:r>
-            <a:endParaRPr lang="en-US" dirty="0">
-              <a:latin typeface="Times New Roman"/>
-              <a:cs typeface="Times New Roman"/>
-            </a:endParaRPr>
+        </p:spPr>
+        <p:style>
+          <a:lnRef idx="2">
+            <a:schemeClr val="dk1"/>
+          </a:lnRef>
+          <a:fillRef idx="1">
+            <a:schemeClr val="lt1"/>
+          </a:fillRef>
+          <a:effectRef idx="0">
+            <a:schemeClr val="dk1"/>
+          </a:effectRef>
+          <a:fontRef idx="minor">
+            <a:schemeClr val="dk1"/>
+          </a:fontRef>
+        </p:style>
+        <p:txBody>
+          <a:bodyPr rtlCol="0" anchor="ctr"/>
+          <a:lstStyle/>
+          <a:p>
+            <a:pPr algn="ctr"/>
+            <a:endParaRPr lang="en-US"/>
           </a:p>
         </p:txBody>
       </p:sp>
       <p:cxnSp>
         <p:nvCxnSpPr>
-          <p:cNvPr id="65" name="Straight Arrow Connector 64"/>
+          <p:cNvPr id="90" name="Straight Arrow Connector 89"/>
           <p:cNvCxnSpPr/>
           <p:nvPr/>
         </p:nvCxnSpPr>
         <p:spPr>
-          <a:xfrm flipV="1">
-            <a:off x="451851" y="3884992"/>
-            <a:ext cx="2351547" cy="1107988"/>
+          <a:xfrm>
+            <a:off x="1280415" y="1614528"/>
+            <a:ext cx="113809" cy="469412"/>
           </a:xfrm>
           <a:prstGeom prst="straightConnector1">
             <a:avLst/>
           </a:prstGeom>
           <a:ln>
             <a:solidFill>
-              <a:srgbClr val="FF0000"/>
+              <a:schemeClr val="tx1"/>
             </a:solidFill>
-            <a:headEnd type="arrow"/>
             <a:tailEnd type="arrow"/>
           </a:ln>
         </p:spPr>
@@ -3431,59 +3962,676 @@
       </p:cxnSp>
       <p:sp>
         <p:nvSpPr>
-          <p:cNvPr id="66" name="TextBox 65"/>
-          <p:cNvSpPr txBox="1"/>
+          <p:cNvPr id="93" name="Cube 92"/>
+          <p:cNvSpPr/>
           <p:nvPr/>
         </p:nvSpPr>
         <p:spPr>
           <a:xfrm>
-            <a:off x="620408" y="4024546"/>
-            <a:ext cx="1520275" cy="369332"/>
-          </a:xfrm>
-          <a:prstGeom prst="rect">
+            <a:off x="5370778" y="2639131"/>
+            <a:ext cx="320305" cy="331769"/>
+          </a:xfrm>
+          <a:prstGeom prst="cube">
+            <a:avLst>
+              <a:gd name="adj" fmla="val 0"/>
+            </a:avLst>
+          </a:prstGeom>
+        </p:spPr>
+        <p:style>
+          <a:lnRef idx="2">
+            <a:schemeClr val="dk1"/>
+          </a:lnRef>
+          <a:fillRef idx="1">
+            <a:schemeClr val="lt1"/>
+          </a:fillRef>
+          <a:effectRef idx="0">
+            <a:schemeClr val="dk1"/>
+          </a:effectRef>
+          <a:fontRef idx="minor">
+            <a:schemeClr val="dk1"/>
+          </a:fontRef>
+        </p:style>
+        <p:txBody>
+          <a:bodyPr rtlCol="0" anchor="ctr"/>
+          <a:lstStyle/>
+          <a:p>
+            <a:pPr algn="ctr"/>
+            <a:endParaRPr lang="en-US"/>
+          </a:p>
+        </p:txBody>
+      </p:sp>
+      <p:sp>
+        <p:nvSpPr>
+          <p:cNvPr id="94" name="Trapezoid 93"/>
+          <p:cNvSpPr/>
+          <p:nvPr/>
+        </p:nvSpPr>
+        <p:spPr>
+          <a:xfrm>
+            <a:off x="5370778" y="2340971"/>
+            <a:ext cx="320305" cy="299621"/>
+          </a:xfrm>
+          <a:prstGeom prst="trapezoid">
             <a:avLst/>
           </a:prstGeom>
-          <a:noFill/>
-        </p:spPr>
-        <p:txBody>
-          <a:bodyPr wrap="square" rtlCol="0">
-            <a:spAutoFit/>
-          </a:bodyPr>
-          <a:lstStyle/>
-          <a:p>
-            <a:r>
-              <a:rPr lang="en-US" dirty="0" smtClean="0">
+        </p:spPr>
+        <p:style>
+          <a:lnRef idx="2">
+            <a:schemeClr val="dk1"/>
+          </a:lnRef>
+          <a:fillRef idx="1">
+            <a:schemeClr val="lt1"/>
+          </a:fillRef>
+          <a:effectRef idx="0">
+            <a:schemeClr val="dk1"/>
+          </a:effectRef>
+          <a:fontRef idx="minor">
+            <a:schemeClr val="dk1"/>
+          </a:fontRef>
+        </p:style>
+        <p:txBody>
+          <a:bodyPr rtlCol="0" anchor="ctr"/>
+          <a:lstStyle/>
+          <a:p>
+            <a:pPr algn="ctr"/>
+            <a:endParaRPr lang="en-US"/>
+          </a:p>
+        </p:txBody>
+      </p:sp>
+      <p:sp>
+        <p:nvSpPr>
+          <p:cNvPr id="95" name="Cube 94"/>
+          <p:cNvSpPr/>
+          <p:nvPr/>
+        </p:nvSpPr>
+        <p:spPr>
+          <a:xfrm rot="20555765" flipH="1" flipV="1">
+            <a:off x="4318475" y="2982118"/>
+            <a:ext cx="869499" cy="545001"/>
+          </a:xfrm>
+          <a:prstGeom prst="cube">
+            <a:avLst>
+              <a:gd name="adj" fmla="val 23937"/>
+            </a:avLst>
+          </a:prstGeom>
+        </p:spPr>
+        <p:style>
+          <a:lnRef idx="2">
+            <a:schemeClr val="dk1"/>
+          </a:lnRef>
+          <a:fillRef idx="1">
+            <a:schemeClr val="lt1"/>
+          </a:fillRef>
+          <a:effectRef idx="0">
+            <a:schemeClr val="dk1"/>
+          </a:effectRef>
+          <a:fontRef idx="minor">
+            <a:schemeClr val="dk1"/>
+          </a:fontRef>
+        </p:style>
+        <p:txBody>
+          <a:bodyPr rtlCol="0" anchor="ctr"/>
+          <a:lstStyle/>
+          <a:p>
+            <a:pPr algn="ctr"/>
+            <a:endParaRPr lang="en-US"/>
+          </a:p>
+        </p:txBody>
+      </p:sp>
+      <p:sp>
+        <p:nvSpPr>
+          <p:cNvPr id="96" name="Cube 95"/>
+          <p:cNvSpPr/>
+          <p:nvPr/>
+        </p:nvSpPr>
+        <p:spPr>
+          <a:xfrm rot="565866" flipV="1">
+            <a:off x="847355" y="3110060"/>
+            <a:ext cx="856791" cy="567860"/>
+          </a:xfrm>
+          <a:prstGeom prst="cube">
+            <a:avLst/>
+          </a:prstGeom>
+        </p:spPr>
+        <p:style>
+          <a:lnRef idx="2">
+            <a:schemeClr val="dk1"/>
+          </a:lnRef>
+          <a:fillRef idx="1">
+            <a:schemeClr val="lt1"/>
+          </a:fillRef>
+          <a:effectRef idx="0">
+            <a:schemeClr val="dk1"/>
+          </a:effectRef>
+          <a:fontRef idx="minor">
+            <a:schemeClr val="dk1"/>
+          </a:fontRef>
+        </p:style>
+        <p:txBody>
+          <a:bodyPr rtlCol="0" anchor="ctr"/>
+          <a:lstStyle/>
+          <a:p>
+            <a:pPr algn="ctr"/>
+            <a:endParaRPr lang="en-US"/>
+          </a:p>
+        </p:txBody>
+      </p:sp>
+      <p:grpSp>
+        <p:nvGrpSpPr>
+          <p:cNvPr id="7" name="Group 6"/>
+          <p:cNvGrpSpPr/>
+          <p:nvPr/>
+        </p:nvGrpSpPr>
+        <p:grpSpPr>
+          <a:xfrm>
+            <a:off x="473318" y="1286513"/>
+            <a:ext cx="4719039" cy="4995474"/>
+            <a:chOff x="408878" y="1313934"/>
+            <a:chExt cx="4719039" cy="4995474"/>
+          </a:xfrm>
+        </p:grpSpPr>
+        <p:pic>
+          <p:nvPicPr>
+            <p:cNvPr id="1026" name="Picture 2"/>
+            <p:cNvPicPr>
+              <a:picLocks noChangeAspect="1" noChangeArrowheads="1"/>
+            </p:cNvPicPr>
+            <p:nvPr/>
+          </p:nvPicPr>
+          <p:blipFill>
+            <a:blip r:embed="rId3">
+              <a:extLst>
+                <a:ext uri="{28A0092B-C50C-407E-A947-70E740481C1C}">
+                  <a14:useLocalDpi xmlns:a14="http://schemas.microsoft.com/office/drawing/2010/main" val="0"/>
+                </a:ext>
+              </a:extLst>
+            </a:blip>
+            <a:srcRect/>
+            <a:stretch>
+              <a:fillRect/>
+            </a:stretch>
+          </p:blipFill>
+          <p:spPr bwMode="auto">
+            <a:xfrm>
+              <a:off x="547362" y="4061920"/>
+              <a:ext cx="4228900" cy="2247488"/>
+            </a:xfrm>
+            <a:prstGeom prst="rect">
+              <a:avLst/>
+            </a:prstGeom>
+            <a:noFill/>
+            <a:ln>
+              <a:noFill/>
+            </a:ln>
+            <a:effectLst/>
+            <a:extLst>
+              <a:ext uri="{909E8E84-426E-40DD-AFC4-6F175D3DCCD1}">
+                <a14:hiddenFill xmlns:a14="http://schemas.microsoft.com/office/drawing/2010/main">
+                  <a:solidFill>
+                    <a:schemeClr val="accent1"/>
+                  </a:solidFill>
+                </a14:hiddenFill>
+              </a:ext>
+              <a:ext uri="{91240B29-F687-4F45-9708-019B960494DF}">
+                <a14:hiddenLine xmlns:a14="http://schemas.microsoft.com/office/drawing/2010/main" w="9525">
+                  <a:solidFill>
+                    <a:schemeClr val="tx1"/>
+                  </a:solidFill>
+                  <a:miter lim="800000"/>
+                  <a:headEnd/>
+                  <a:tailEnd/>
+                </a14:hiddenLine>
+              </a:ext>
+              <a:ext uri="{AF507438-7753-43E0-B8FC-AC1667EBCBE1}">
+                <a14:hiddenEffects xmlns:a14="http://schemas.microsoft.com/office/drawing/2010/main">
+                  <a:effectLst>
+                    <a:outerShdw dist="35921" dir="2700000" algn="ctr" rotWithShape="0">
+                      <a:schemeClr val="bg2"/>
+                    </a:outerShdw>
+                  </a:effectLst>
+                </a14:hiddenEffects>
+              </a:ext>
+            </a:extLst>
+          </p:spPr>
+        </p:pic>
+        <p:cxnSp>
+          <p:nvCxnSpPr>
+            <p:cNvPr id="65" name="Straight Arrow Connector 64"/>
+            <p:cNvCxnSpPr/>
+            <p:nvPr/>
+          </p:nvCxnSpPr>
+          <p:spPr>
+            <a:xfrm flipV="1">
+              <a:off x="408878" y="3993742"/>
+              <a:ext cx="2386331" cy="743432"/>
+            </a:xfrm>
+            <a:prstGeom prst="straightConnector1">
+              <a:avLst/>
+            </a:prstGeom>
+            <a:ln>
+              <a:solidFill>
+                <a:srgbClr val="FF0000"/>
+              </a:solidFill>
+              <a:headEnd type="arrow"/>
+              <a:tailEnd type="arrow"/>
+            </a:ln>
+          </p:spPr>
+          <p:style>
+            <a:lnRef idx="2">
+              <a:schemeClr val="accent1"/>
+            </a:lnRef>
+            <a:fillRef idx="0">
+              <a:schemeClr val="accent1"/>
+            </a:fillRef>
+            <a:effectRef idx="1">
+              <a:schemeClr val="accent1"/>
+            </a:effectRef>
+            <a:fontRef idx="minor">
+              <a:schemeClr val="tx1"/>
+            </a:fontRef>
+          </p:style>
+        </p:cxnSp>
+        <p:sp>
+          <p:nvSpPr>
+            <p:cNvPr id="66" name="TextBox 65"/>
+            <p:cNvSpPr txBox="1"/>
+            <p:nvPr/>
+          </p:nvSpPr>
+          <p:spPr>
+            <a:xfrm>
+              <a:off x="1255994" y="3956367"/>
+              <a:ext cx="1520275" cy="369332"/>
+            </a:xfrm>
+            <a:prstGeom prst="rect">
+              <a:avLst/>
+            </a:prstGeom>
+            <a:noFill/>
+          </p:spPr>
+          <p:txBody>
+            <a:bodyPr wrap="square" rtlCol="0">
+              <a:spAutoFit/>
+            </a:bodyPr>
+            <a:lstStyle/>
+            <a:p>
+              <a:r>
+                <a:rPr lang="en-US" dirty="0" smtClean="0">
+                  <a:latin typeface="Times"/>
+                  <a:cs typeface="Times"/>
+                </a:rPr>
+                <a:t>1.5 m</a:t>
+              </a:r>
+              <a:endParaRPr lang="en-US" dirty="0">
                 <a:latin typeface="Times"/>
                 <a:cs typeface="Times"/>
-              </a:rPr>
-              <a:t>1.5 m</a:t>
-            </a:r>
-            <a:endParaRPr lang="en-US" dirty="0">
-              <a:latin typeface="Times"/>
-              <a:cs typeface="Times"/>
-            </a:endParaRPr>
-          </a:p>
-        </p:txBody>
-      </p:sp>
+              </a:endParaRPr>
+            </a:p>
+          </p:txBody>
+        </p:sp>
+        <p:cxnSp>
+          <p:nvCxnSpPr>
+            <p:cNvPr id="67" name="Straight Arrow Connector 66"/>
+            <p:cNvCxnSpPr/>
+            <p:nvPr/>
+          </p:nvCxnSpPr>
+          <p:spPr>
+            <a:xfrm>
+              <a:off x="2932014" y="3993742"/>
+              <a:ext cx="1844248" cy="294583"/>
+            </a:xfrm>
+            <a:prstGeom prst="straightConnector1">
+              <a:avLst/>
+            </a:prstGeom>
+            <a:ln>
+              <a:solidFill>
+                <a:srgbClr val="FF0000"/>
+              </a:solidFill>
+              <a:headEnd type="arrow"/>
+              <a:tailEnd type="arrow"/>
+            </a:ln>
+          </p:spPr>
+          <p:style>
+            <a:lnRef idx="2">
+              <a:schemeClr val="accent1"/>
+            </a:lnRef>
+            <a:fillRef idx="0">
+              <a:schemeClr val="accent1"/>
+            </a:fillRef>
+            <a:effectRef idx="1">
+              <a:schemeClr val="accent1"/>
+            </a:effectRef>
+            <a:fontRef idx="minor">
+              <a:schemeClr val="tx1"/>
+            </a:fontRef>
+          </p:style>
+        </p:cxnSp>
+        <p:sp>
+          <p:nvSpPr>
+            <p:cNvPr id="74" name="TextBox 73"/>
+            <p:cNvSpPr txBox="1"/>
+            <p:nvPr/>
+          </p:nvSpPr>
+          <p:spPr>
+            <a:xfrm>
+              <a:off x="2179349" y="2579679"/>
+              <a:ext cx="1728579" cy="369332"/>
+            </a:xfrm>
+            <a:prstGeom prst="rect">
+              <a:avLst/>
+            </a:prstGeom>
+            <a:noFill/>
+          </p:spPr>
+          <p:txBody>
+            <a:bodyPr wrap="square" rtlCol="0">
+              <a:spAutoFit/>
+            </a:bodyPr>
+            <a:lstStyle/>
+            <a:p>
+              <a:r>
+                <a:rPr lang="en-US" dirty="0">
+                  <a:latin typeface="Times"/>
+                  <a:cs typeface="Times"/>
+                </a:rPr>
+                <a:t>1</a:t>
+              </a:r>
+              <a:r>
+                <a:rPr lang="en-US" dirty="0" smtClean="0">
+                  <a:latin typeface="Times"/>
+                  <a:cs typeface="Times"/>
+                </a:rPr>
+                <a:t>.5 m</a:t>
+              </a:r>
+              <a:endParaRPr lang="en-US" dirty="0">
+                <a:latin typeface="Times"/>
+                <a:cs typeface="Times"/>
+              </a:endParaRPr>
+            </a:p>
+          </p:txBody>
+        </p:sp>
+        <p:sp>
+          <p:nvSpPr>
+            <p:cNvPr id="35" name="TextBox 34"/>
+            <p:cNvSpPr txBox="1"/>
+            <p:nvPr/>
+          </p:nvSpPr>
+          <p:spPr>
+            <a:xfrm>
+              <a:off x="3607642" y="3771701"/>
+              <a:ext cx="1520275" cy="369332"/>
+            </a:xfrm>
+            <a:prstGeom prst="rect">
+              <a:avLst/>
+            </a:prstGeom>
+            <a:noFill/>
+          </p:spPr>
+          <p:txBody>
+            <a:bodyPr wrap="square" rtlCol="0">
+              <a:spAutoFit/>
+            </a:bodyPr>
+            <a:lstStyle/>
+            <a:p>
+              <a:r>
+                <a:rPr lang="en-US" dirty="0" smtClean="0">
+                  <a:latin typeface="Times"/>
+                  <a:cs typeface="Times"/>
+                </a:rPr>
+                <a:t>1.2 m</a:t>
+              </a:r>
+              <a:endParaRPr lang="en-US" dirty="0">
+                <a:latin typeface="Times"/>
+                <a:cs typeface="Times"/>
+              </a:endParaRPr>
+            </a:p>
+          </p:txBody>
+        </p:sp>
+        <p:cxnSp>
+          <p:nvCxnSpPr>
+            <p:cNvPr id="73" name="Straight Arrow Connector 72"/>
+            <p:cNvCxnSpPr/>
+            <p:nvPr/>
+          </p:nvCxnSpPr>
+          <p:spPr>
+            <a:xfrm flipV="1">
+              <a:off x="2886179" y="1313934"/>
+              <a:ext cx="0" cy="3318774"/>
+            </a:xfrm>
+            <a:prstGeom prst="straightConnector1">
+              <a:avLst/>
+            </a:prstGeom>
+            <a:ln>
+              <a:solidFill>
+                <a:srgbClr val="FF0000"/>
+              </a:solidFill>
+              <a:headEnd type="arrow"/>
+              <a:tailEnd type="arrow"/>
+            </a:ln>
+          </p:spPr>
+          <p:style>
+            <a:lnRef idx="2">
+              <a:schemeClr val="accent1"/>
+            </a:lnRef>
+            <a:fillRef idx="0">
+              <a:schemeClr val="accent1"/>
+            </a:fillRef>
+            <a:effectRef idx="1">
+              <a:schemeClr val="accent1"/>
+            </a:effectRef>
+            <a:fontRef idx="minor">
+              <a:schemeClr val="tx1"/>
+            </a:fontRef>
+          </p:style>
+        </p:cxnSp>
+      </p:grpSp>
+      <p:grpSp>
+        <p:nvGrpSpPr>
+          <p:cNvPr id="17" name="Group 16"/>
+          <p:cNvGrpSpPr/>
+          <p:nvPr/>
+        </p:nvGrpSpPr>
+        <p:grpSpPr>
+          <a:xfrm>
+            <a:off x="2950619" y="4397701"/>
+            <a:ext cx="2454887" cy="1899202"/>
+            <a:chOff x="2886179" y="4425122"/>
+            <a:chExt cx="2454887" cy="1899202"/>
+          </a:xfrm>
+        </p:grpSpPr>
+        <p:sp>
+          <p:nvSpPr>
+            <p:cNvPr id="69" name="TextBox 68"/>
+            <p:cNvSpPr txBox="1"/>
+            <p:nvPr/>
+          </p:nvSpPr>
+          <p:spPr>
+            <a:xfrm>
+              <a:off x="4479202" y="4940135"/>
+              <a:ext cx="861864" cy="369332"/>
+            </a:xfrm>
+            <a:prstGeom prst="rect">
+              <a:avLst/>
+            </a:prstGeom>
+            <a:noFill/>
+          </p:spPr>
+          <p:txBody>
+            <a:bodyPr wrap="square" rtlCol="0">
+              <a:spAutoFit/>
+            </a:bodyPr>
+            <a:lstStyle/>
+            <a:p>
+              <a:pPr algn="ctr"/>
+              <a:r>
+                <a:rPr lang="en-US" dirty="0" smtClean="0">
+                  <a:latin typeface="Times"/>
+                  <a:cs typeface="Times"/>
+                </a:rPr>
+                <a:t>Robots</a:t>
+              </a:r>
+            </a:p>
+          </p:txBody>
+        </p:sp>
+        <p:cxnSp>
+          <p:nvCxnSpPr>
+            <p:cNvPr id="24" name="Straight Arrow Connector 23"/>
+            <p:cNvCxnSpPr/>
+            <p:nvPr/>
+          </p:nvCxnSpPr>
+          <p:spPr>
+            <a:xfrm flipH="1" flipV="1">
+              <a:off x="3385270" y="4425122"/>
+              <a:ext cx="982509" cy="965425"/>
+            </a:xfrm>
+            <a:prstGeom prst="straightConnector1">
+              <a:avLst/>
+            </a:prstGeom>
+            <a:ln>
+              <a:solidFill>
+                <a:schemeClr val="tx1"/>
+              </a:solidFill>
+              <a:tailEnd type="arrow"/>
+            </a:ln>
+          </p:spPr>
+          <p:style>
+            <a:lnRef idx="2">
+              <a:schemeClr val="accent1"/>
+            </a:lnRef>
+            <a:fillRef idx="0">
+              <a:schemeClr val="accent1"/>
+            </a:fillRef>
+            <a:effectRef idx="1">
+              <a:schemeClr val="accent1"/>
+            </a:effectRef>
+            <a:fontRef idx="minor">
+              <a:schemeClr val="tx1"/>
+            </a:fontRef>
+          </p:style>
+        </p:cxnSp>
+        <p:cxnSp>
+          <p:nvCxnSpPr>
+            <p:cNvPr id="29" name="Straight Arrow Connector 28"/>
+            <p:cNvCxnSpPr/>
+            <p:nvPr/>
+          </p:nvCxnSpPr>
+          <p:spPr>
+            <a:xfrm flipH="1" flipV="1">
+              <a:off x="2886179" y="5124801"/>
+              <a:ext cx="768075" cy="781093"/>
+            </a:xfrm>
+            <a:prstGeom prst="straightConnector1">
+              <a:avLst/>
+            </a:prstGeom>
+            <a:ln>
+              <a:solidFill>
+                <a:schemeClr val="tx1"/>
+              </a:solidFill>
+              <a:tailEnd type="arrow"/>
+            </a:ln>
+          </p:spPr>
+          <p:style>
+            <a:lnRef idx="2">
+              <a:schemeClr val="accent1"/>
+            </a:lnRef>
+            <a:fillRef idx="0">
+              <a:schemeClr val="accent1"/>
+            </a:fillRef>
+            <a:effectRef idx="1">
+              <a:schemeClr val="accent1"/>
+            </a:effectRef>
+            <a:fontRef idx="minor">
+              <a:schemeClr val="tx1"/>
+            </a:fontRef>
+          </p:style>
+        </p:cxnSp>
+        <p:sp>
+          <p:nvSpPr>
+            <p:cNvPr id="33" name="TextBox 32"/>
+            <p:cNvSpPr txBox="1"/>
+            <p:nvPr/>
+          </p:nvSpPr>
+          <p:spPr>
+            <a:xfrm>
+              <a:off x="3463118" y="5954992"/>
+              <a:ext cx="1096816" cy="369332"/>
+            </a:xfrm>
+            <a:prstGeom prst="rect">
+              <a:avLst/>
+            </a:prstGeom>
+            <a:noFill/>
+          </p:spPr>
+          <p:txBody>
+            <a:bodyPr wrap="square" rtlCol="0">
+              <a:spAutoFit/>
+            </a:bodyPr>
+            <a:lstStyle/>
+            <a:p>
+              <a:pPr algn="ctr"/>
+              <a:r>
+                <a:rPr lang="en-US" dirty="0" smtClean="0">
+                  <a:latin typeface="Times"/>
+                  <a:cs typeface="Times"/>
+                </a:rPr>
+                <a:t>Obstacle</a:t>
+              </a:r>
+              <a:endParaRPr lang="en-US" dirty="0" smtClean="0">
+                <a:latin typeface="Times"/>
+                <a:cs typeface="Times"/>
+              </a:endParaRPr>
+            </a:p>
+          </p:txBody>
+        </p:sp>
+        <p:cxnSp>
+          <p:nvCxnSpPr>
+            <p:cNvPr id="42" name="Straight Arrow Connector 41"/>
+            <p:cNvCxnSpPr/>
+            <p:nvPr/>
+          </p:nvCxnSpPr>
+          <p:spPr>
+            <a:xfrm flipH="1" flipV="1">
+              <a:off x="4319646" y="4548875"/>
+              <a:ext cx="456616" cy="410452"/>
+            </a:xfrm>
+            <a:prstGeom prst="straightConnector1">
+              <a:avLst/>
+            </a:prstGeom>
+            <a:ln>
+              <a:solidFill>
+                <a:schemeClr val="tx1"/>
+              </a:solidFill>
+              <a:tailEnd type="arrow"/>
+            </a:ln>
+          </p:spPr>
+          <p:style>
+            <a:lnRef idx="2">
+              <a:schemeClr val="accent1"/>
+            </a:lnRef>
+            <a:fillRef idx="0">
+              <a:schemeClr val="accent1"/>
+            </a:fillRef>
+            <a:effectRef idx="1">
+              <a:schemeClr val="accent1"/>
+            </a:effectRef>
+            <a:fontRef idx="minor">
+              <a:schemeClr val="tx1"/>
+            </a:fontRef>
+          </p:style>
+        </p:cxnSp>
+      </p:grpSp>
       <p:cxnSp>
         <p:nvCxnSpPr>
-          <p:cNvPr id="67" name="Straight Arrow Connector 66"/>
+          <p:cNvPr id="63" name="Straight Arrow Connector 62"/>
           <p:cNvCxnSpPr/>
           <p:nvPr/>
         </p:nvCxnSpPr>
         <p:spPr>
-          <a:xfrm>
-            <a:off x="3182053" y="3804299"/>
-            <a:ext cx="1851817" cy="57612"/>
+          <a:xfrm flipV="1">
+            <a:off x="1122798" y="5443086"/>
+            <a:ext cx="295305" cy="435387"/>
           </a:xfrm>
           <a:prstGeom prst="straightConnector1">
             <a:avLst/>
           </a:prstGeom>
           <a:ln>
             <a:solidFill>
-              <a:srgbClr val="FF0000"/>
+              <a:schemeClr val="tx1"/>
             </a:solidFill>
-            <a:headEnd type="arrow"/>
             <a:tailEnd type="arrow"/>
           </a:ln>
         </p:spPr>
@@ -3504,14 +4652,14 @@
       </p:cxnSp>
       <p:sp>
         <p:nvSpPr>
-          <p:cNvPr id="68" name="TextBox 67"/>
+          <p:cNvPr id="64" name="TextBox 63"/>
           <p:cNvSpPr txBox="1"/>
           <p:nvPr/>
         </p:nvSpPr>
         <p:spPr>
           <a:xfrm>
-            <a:off x="3798063" y="3336225"/>
-            <a:ext cx="1520275" cy="369332"/>
+            <a:off x="136198" y="5912655"/>
+            <a:ext cx="2076297" cy="369332"/>
           </a:xfrm>
           <a:prstGeom prst="rect">
             <a:avLst/>
@@ -3524,510 +4672,298 @@
           </a:bodyPr>
           <a:lstStyle/>
           <a:p>
+            <a:pPr algn="ctr"/>
+            <a:r>
+              <a:rPr lang="en-US" dirty="0" smtClean="0">
+                <a:latin typeface="Times New Roman"/>
+                <a:cs typeface="Times New Roman"/>
+              </a:rPr>
+              <a:t>Table </a:t>
+            </a:r>
+            <a:r>
+              <a:rPr lang="en-US" dirty="0" smtClean="0">
+                <a:latin typeface="Times New Roman"/>
+                <a:cs typeface="Times New Roman"/>
+              </a:rPr>
+              <a:t>of the Robots</a:t>
+            </a:r>
+            <a:endParaRPr lang="en-US" dirty="0">
+              <a:latin typeface="Times New Roman"/>
+              <a:cs typeface="Times New Roman"/>
+            </a:endParaRPr>
+          </a:p>
+        </p:txBody>
+      </p:sp>
+      <p:sp>
+        <p:nvSpPr>
+          <p:cNvPr id="92" name="Cube 91"/>
+          <p:cNvSpPr/>
+          <p:nvPr/>
+        </p:nvSpPr>
+        <p:spPr>
+          <a:xfrm>
+            <a:off x="2514847" y="3183166"/>
+            <a:ext cx="952312" cy="521052"/>
+          </a:xfrm>
+          <a:prstGeom prst="cube">
+            <a:avLst>
+              <a:gd name="adj" fmla="val 0"/>
+            </a:avLst>
+          </a:prstGeom>
+        </p:spPr>
+        <p:style>
+          <a:lnRef idx="2">
+            <a:schemeClr val="dk1"/>
+          </a:lnRef>
+          <a:fillRef idx="1">
+            <a:schemeClr val="lt1"/>
+          </a:fillRef>
+          <a:effectRef idx="0">
+            <a:schemeClr val="dk1"/>
+          </a:effectRef>
+          <a:fontRef idx="minor">
+            <a:schemeClr val="dk1"/>
+          </a:fontRef>
+        </p:style>
+        <p:txBody>
+          <a:bodyPr rtlCol="0" anchor="ctr"/>
+          <a:lstStyle/>
+          <a:p>
+            <a:pPr algn="ctr"/>
+            <a:endParaRPr lang="en-US"/>
+          </a:p>
+        </p:txBody>
+      </p:sp>
+      <p:sp>
+        <p:nvSpPr>
+          <p:cNvPr id="91" name="Trapezoid 90"/>
+          <p:cNvSpPr/>
+          <p:nvPr/>
+        </p:nvSpPr>
+        <p:spPr>
+          <a:xfrm flipV="1">
+            <a:off x="2514847" y="3706693"/>
+            <a:ext cx="952312" cy="127062"/>
+          </a:xfrm>
+          <a:prstGeom prst="trapezoid">
+            <a:avLst/>
+          </a:prstGeom>
+        </p:spPr>
+        <p:style>
+          <a:lnRef idx="2">
+            <a:schemeClr val="dk1"/>
+          </a:lnRef>
+          <a:fillRef idx="1">
+            <a:schemeClr val="lt1"/>
+          </a:fillRef>
+          <a:effectRef idx="0">
+            <a:schemeClr val="dk1"/>
+          </a:effectRef>
+          <a:fontRef idx="minor">
+            <a:schemeClr val="dk1"/>
+          </a:fontRef>
+        </p:style>
+        <p:txBody>
+          <a:bodyPr rtlCol="0" anchor="ctr"/>
+          <a:lstStyle/>
+          <a:p>
+            <a:pPr algn="ctr"/>
+            <a:endParaRPr lang="en-US"/>
+          </a:p>
+        </p:txBody>
+      </p:sp>
+      <p:sp>
+        <p:nvSpPr>
+          <p:cNvPr id="71" name="Oval 3"/>
+          <p:cNvSpPr>
+            <a:spLocks noChangeArrowheads="1"/>
+          </p:cNvSpPr>
+          <p:nvPr/>
+        </p:nvSpPr>
+        <p:spPr bwMode="auto">
+          <a:xfrm>
+            <a:off x="5464664" y="2793994"/>
+            <a:ext cx="2261567" cy="2303386"/>
+          </a:xfrm>
+          <a:prstGeom prst="ellipse">
+            <a:avLst/>
+          </a:prstGeom>
+          <a:noFill/>
+          <a:ln w="9525">
+            <a:solidFill>
+              <a:schemeClr val="tx1"/>
+            </a:solidFill>
+            <a:round/>
+            <a:headEnd/>
+            <a:tailEnd/>
+          </a:ln>
+          <a:extLst>
+            <a:ext uri="{909E8E84-426E-40DD-AFC4-6F175D3DCCD1}">
+              <a14:hiddenFill xmlns:a14="http://schemas.microsoft.com/office/drawing/2010/main">
+                <a:solidFill>
+                  <a:srgbClr val="FFFFFF"/>
+                </a:solidFill>
+              </a14:hiddenFill>
+            </a:ext>
+          </a:extLst>
+        </p:spPr>
+        <p:txBody>
+          <a:bodyPr/>
+          <a:lstStyle/>
+          <a:p>
+            <a:endParaRPr lang="en-US">
+              <a:ea typeface="ＭＳ Ｐゴシック" charset="0"/>
+              <a:cs typeface="ＭＳ Ｐゴシック" charset="0"/>
+            </a:endParaRPr>
+          </a:p>
+        </p:txBody>
+      </p:sp>
+      <p:sp>
+        <p:nvSpPr>
+          <p:cNvPr id="72" name="Oval 25"/>
+          <p:cNvSpPr>
+            <a:spLocks noChangeArrowheads="1"/>
+          </p:cNvSpPr>
+          <p:nvPr/>
+        </p:nvSpPr>
+        <p:spPr bwMode="auto">
+          <a:xfrm flipV="1">
+            <a:off x="4347445" y="4477069"/>
+            <a:ext cx="77657" cy="60872"/>
+          </a:xfrm>
+          <a:prstGeom prst="ellipse">
+            <a:avLst/>
+          </a:prstGeom>
+          <a:noFill/>
+          <a:ln w="9525">
+            <a:solidFill>
+              <a:schemeClr val="tx1"/>
+            </a:solidFill>
+            <a:round/>
+            <a:headEnd/>
+            <a:tailEnd/>
+          </a:ln>
+          <a:extLst>
+            <a:ext uri="{909E8E84-426E-40DD-AFC4-6F175D3DCCD1}">
+              <a14:hiddenFill xmlns:a14="http://schemas.microsoft.com/office/drawing/2010/main">
+                <a:solidFill>
+                  <a:srgbClr val="FFFFFF"/>
+                </a:solidFill>
+              </a14:hiddenFill>
+            </a:ext>
+          </a:extLst>
+        </p:spPr>
+        <p:txBody>
+          <a:bodyPr/>
+          <a:lstStyle/>
+          <a:p>
+            <a:endParaRPr lang="en-US">
+              <a:ea typeface="ＭＳ Ｐゴシック" charset="0"/>
+              <a:cs typeface="ＭＳ Ｐゴシック" charset="0"/>
+            </a:endParaRPr>
+          </a:p>
+        </p:txBody>
+      </p:sp>
+      <p:cxnSp>
+        <p:nvCxnSpPr>
+          <p:cNvPr id="76" name="Straight Connector 5"/>
+          <p:cNvCxnSpPr>
+            <a:cxnSpLocks noChangeShapeType="1"/>
+            <a:stCxn id="71" idx="1"/>
+            <a:endCxn id="72" idx="4"/>
+          </p:cNvCxnSpPr>
+          <p:nvPr/>
+        </p:nvCxnSpPr>
+        <p:spPr bwMode="auto">
+          <a:xfrm flipH="1">
+            <a:off x="4386274" y="3131317"/>
+            <a:ext cx="1409589" cy="1345752"/>
+          </a:xfrm>
+          <a:prstGeom prst="line">
+            <a:avLst/>
+          </a:prstGeom>
+          <a:noFill/>
+          <a:ln w="9525">
+            <a:solidFill>
+              <a:schemeClr val="tx1"/>
+            </a:solidFill>
+            <a:round/>
+            <a:headEnd/>
+            <a:tailEnd/>
+          </a:ln>
+          <a:extLst>
+            <a:ext uri="{909E8E84-426E-40DD-AFC4-6F175D3DCCD1}">
+              <a14:hiddenFill xmlns:a14="http://schemas.microsoft.com/office/drawing/2010/main">
+                <a:noFill/>
+              </a14:hiddenFill>
+            </a:ext>
+          </a:extLst>
+        </p:spPr>
+      </p:cxnSp>
+      <p:cxnSp>
+        <p:nvCxnSpPr>
+          <p:cNvPr id="77" name="Straight Connector 28"/>
+          <p:cNvCxnSpPr>
+            <a:cxnSpLocks noChangeShapeType="1"/>
+            <a:stCxn id="72" idx="0"/>
+          </p:cNvCxnSpPr>
+          <p:nvPr/>
+        </p:nvCxnSpPr>
+        <p:spPr bwMode="auto">
+          <a:xfrm>
+            <a:off x="4386274" y="4537941"/>
+            <a:ext cx="1612190" cy="393965"/>
+          </a:xfrm>
+          <a:prstGeom prst="line">
+            <a:avLst/>
+          </a:prstGeom>
+          <a:noFill/>
+          <a:ln w="9525">
+            <a:solidFill>
+              <a:schemeClr val="tx1"/>
+            </a:solidFill>
+            <a:round/>
+            <a:headEnd/>
+            <a:tailEnd/>
+          </a:ln>
+          <a:extLst>
+            <a:ext uri="{909E8E84-426E-40DD-AFC4-6F175D3DCCD1}">
+              <a14:hiddenFill xmlns:a14="http://schemas.microsoft.com/office/drawing/2010/main">
+                <a:noFill/>
+              </a14:hiddenFill>
+            </a:ext>
+          </a:extLst>
+        </p:spPr>
+      </p:cxnSp>
+      <p:sp>
+        <p:nvSpPr>
+          <p:cNvPr id="82" name="TextBox 81"/>
+          <p:cNvSpPr txBox="1"/>
+          <p:nvPr/>
+        </p:nvSpPr>
+        <p:spPr>
+          <a:xfrm>
+            <a:off x="4003680" y="5307788"/>
+            <a:ext cx="970894" cy="369332"/>
+          </a:xfrm>
+          <a:prstGeom prst="rect">
+            <a:avLst/>
+          </a:prstGeom>
+          <a:noFill/>
+        </p:spPr>
+        <p:txBody>
+          <a:bodyPr wrap="square" rtlCol="0">
+            <a:spAutoFit/>
+          </a:bodyPr>
+          <a:lstStyle/>
+          <a:p>
+            <a:pPr algn="ctr"/>
             <a:r>
               <a:rPr lang="en-US" dirty="0" smtClean="0">
                 <a:latin typeface="Times"/>
                 <a:cs typeface="Times"/>
               </a:rPr>
-              <a:t>1.2 m</a:t>
-            </a:r>
-            <a:endParaRPr lang="en-US" dirty="0">
-              <a:latin typeface="Times"/>
-              <a:cs typeface="Times"/>
-            </a:endParaRPr>
-          </a:p>
-        </p:txBody>
-      </p:sp>
-      <p:sp>
-        <p:nvSpPr>
-          <p:cNvPr id="69" name="TextBox 68"/>
-          <p:cNvSpPr txBox="1"/>
-          <p:nvPr/>
-        </p:nvSpPr>
-        <p:spPr>
-          <a:xfrm>
-            <a:off x="5286001" y="3428809"/>
-            <a:ext cx="1037363" cy="369332"/>
-          </a:xfrm>
-          <a:prstGeom prst="rect">
-            <a:avLst/>
-          </a:prstGeom>
-          <a:noFill/>
-        </p:spPr>
-        <p:txBody>
-          <a:bodyPr wrap="square" rtlCol="0">
-            <a:spAutoFit/>
-          </a:bodyPr>
-          <a:lstStyle/>
-          <a:p>
-            <a:r>
-              <a:rPr lang="en-US" dirty="0" smtClean="0">
-                <a:latin typeface="Times"/>
-                <a:cs typeface="Times"/>
-              </a:rPr>
-              <a:t>Robots</a:t>
-            </a:r>
-          </a:p>
-        </p:txBody>
-      </p:sp>
-      <p:pic>
-        <p:nvPicPr>
-          <p:cNvPr id="70" name="Picture 69" descr="Webcam.jpg"/>
-          <p:cNvPicPr>
-            <a:picLocks noChangeAspect="1"/>
-          </p:cNvPicPr>
-          <p:nvPr/>
-        </p:nvPicPr>
-        <p:blipFill>
-          <a:blip r:embed="rId2" cstate="screen">
-            <a:extLst>
-              <a:ext uri="{28A0092B-C50C-407E-A947-70E740481C1C}">
-                <a14:useLocalDpi xmlns:a14="http://schemas.microsoft.com/office/drawing/2010/main"/>
-              </a:ext>
-            </a:extLst>
-          </a:blip>
-          <a:stretch>
-            <a:fillRect/>
-          </a:stretch>
-        </p:blipFill>
-        <p:spPr>
-          <a:xfrm>
-            <a:off x="2737965" y="69023"/>
-            <a:ext cx="381918" cy="986621"/>
-          </a:xfrm>
-          <a:prstGeom prst="rect">
-            <a:avLst/>
-          </a:prstGeom>
-        </p:spPr>
-      </p:pic>
-      <p:pic>
-        <p:nvPicPr>
-          <p:cNvPr id="71" name="Picture 70" descr="Light1.jpg"/>
-          <p:cNvPicPr>
-            <a:picLocks noChangeAspect="1"/>
-          </p:cNvPicPr>
-          <p:nvPr/>
-        </p:nvPicPr>
-        <p:blipFill>
-          <a:blip r:embed="rId3">
-            <a:extLst>
-              <a:ext uri="{28A0092B-C50C-407E-A947-70E740481C1C}">
-                <a14:useLocalDpi xmlns:a14="http://schemas.microsoft.com/office/drawing/2010/main"/>
-              </a:ext>
-            </a:extLst>
-          </a:blip>
-          <a:stretch>
-            <a:fillRect/>
-          </a:stretch>
-        </p:blipFill>
-        <p:spPr>
-          <a:xfrm>
-            <a:off x="69572" y="656093"/>
-            <a:ext cx="958850" cy="1054100"/>
-          </a:xfrm>
-          <a:prstGeom prst="rect">
-            <a:avLst/>
-          </a:prstGeom>
-        </p:spPr>
-      </p:pic>
-      <p:pic>
-        <p:nvPicPr>
-          <p:cNvPr id="72" name="Picture 71" descr="Light2.jpg"/>
-          <p:cNvPicPr>
-            <a:picLocks noChangeAspect="1"/>
-          </p:cNvPicPr>
-          <p:nvPr/>
-        </p:nvPicPr>
-        <p:blipFill>
-          <a:blip r:embed="rId4">
-            <a:extLst>
-              <a:ext uri="{28A0092B-C50C-407E-A947-70E740481C1C}">
-                <a14:useLocalDpi xmlns:a14="http://schemas.microsoft.com/office/drawing/2010/main"/>
-              </a:ext>
-            </a:extLst>
-          </a:blip>
-          <a:stretch>
-            <a:fillRect/>
-          </a:stretch>
-        </p:blipFill>
-        <p:spPr>
-          <a:xfrm>
-            <a:off x="4966491" y="746853"/>
-            <a:ext cx="1120302" cy="905145"/>
-          </a:xfrm>
-          <a:prstGeom prst="rect">
-            <a:avLst/>
-          </a:prstGeom>
-        </p:spPr>
-      </p:pic>
-      <p:cxnSp>
-        <p:nvCxnSpPr>
-          <p:cNvPr id="73" name="Straight Arrow Connector 72"/>
-          <p:cNvCxnSpPr/>
-          <p:nvPr/>
-        </p:nvCxnSpPr>
-        <p:spPr>
-          <a:xfrm flipV="1">
-            <a:off x="2928924" y="1174359"/>
-            <a:ext cx="17885" cy="2629940"/>
-          </a:xfrm>
-          <a:prstGeom prst="straightConnector1">
-            <a:avLst/>
-          </a:prstGeom>
-          <a:ln>
-            <a:solidFill>
-              <a:srgbClr val="FF0000"/>
-            </a:solidFill>
-            <a:headEnd type="arrow"/>
-            <a:tailEnd type="arrow"/>
-          </a:ln>
-        </p:spPr>
-        <p:style>
-          <a:lnRef idx="2">
-            <a:schemeClr val="accent1"/>
-          </a:lnRef>
-          <a:fillRef idx="0">
-            <a:schemeClr val="accent1"/>
-          </a:fillRef>
-          <a:effectRef idx="1">
-            <a:schemeClr val="accent1"/>
-          </a:effectRef>
-          <a:fontRef idx="minor">
-            <a:schemeClr val="tx1"/>
-          </a:fontRef>
-        </p:style>
-      </p:cxnSp>
-      <p:sp>
-        <p:nvSpPr>
-          <p:cNvPr id="74" name="TextBox 73"/>
-          <p:cNvSpPr txBox="1"/>
-          <p:nvPr/>
-        </p:nvSpPr>
-        <p:spPr>
-          <a:xfrm>
-            <a:off x="3047684" y="2159103"/>
-            <a:ext cx="1728579" cy="369332"/>
-          </a:xfrm>
-          <a:prstGeom prst="rect">
-            <a:avLst/>
-          </a:prstGeom>
-          <a:noFill/>
-        </p:spPr>
-        <p:txBody>
-          <a:bodyPr wrap="square" rtlCol="0">
-            <a:spAutoFit/>
-          </a:bodyPr>
-          <a:lstStyle/>
-          <a:p>
-            <a:r>
-              <a:rPr lang="en-US" dirty="0">
-                <a:latin typeface="Times"/>
-                <a:cs typeface="Times"/>
-              </a:rPr>
-              <a:t>1</a:t>
-            </a:r>
-            <a:r>
-              <a:rPr lang="en-US" dirty="0" smtClean="0">
-                <a:latin typeface="Times"/>
-                <a:cs typeface="Times"/>
-              </a:rPr>
-              <a:t>.5 m</a:t>
-            </a:r>
-            <a:endParaRPr lang="en-US" dirty="0">
-              <a:latin typeface="Times"/>
-              <a:cs typeface="Times"/>
-            </a:endParaRPr>
-          </a:p>
-        </p:txBody>
-      </p:sp>
-      <p:pic>
-        <p:nvPicPr>
-          <p:cNvPr id="75" name="Picture 74" descr="Kilobot.png"/>
-          <p:cNvPicPr>
-            <a:picLocks noChangeAspect="1"/>
-          </p:cNvPicPr>
-          <p:nvPr/>
-        </p:nvPicPr>
-        <p:blipFill>
-          <a:blip r:embed="rId5" cstate="screen">
-            <a:extLst>
-              <a:ext uri="{28A0092B-C50C-407E-A947-70E740481C1C}">
-                <a14:useLocalDpi xmlns:a14="http://schemas.microsoft.com/office/drawing/2010/main"/>
-              </a:ext>
-            </a:extLst>
-          </a:blip>
-          <a:stretch>
-            <a:fillRect/>
-          </a:stretch>
-        </p:blipFill>
-        <p:spPr>
-          <a:xfrm>
-            <a:off x="5595061" y="2531414"/>
-            <a:ext cx="2266729" cy="2902785"/>
-          </a:xfrm>
-          <a:prstGeom prst="rect">
-            <a:avLst/>
-          </a:prstGeom>
-        </p:spPr>
-      </p:pic>
-      <p:pic>
-        <p:nvPicPr>
-          <p:cNvPr id="76" name="Picture 75" descr="IMG_2356.png"/>
-          <p:cNvPicPr>
-            <a:picLocks noChangeAspect="1"/>
-          </p:cNvPicPr>
-          <p:nvPr/>
-        </p:nvPicPr>
-        <p:blipFill>
-          <a:blip r:embed="rId6" cstate="screen">
-            <a:extLst>
-              <a:ext uri="{28A0092B-C50C-407E-A947-70E740481C1C}">
-                <a14:useLocalDpi xmlns:a14="http://schemas.microsoft.com/office/drawing/2010/main"/>
-              </a:ext>
-            </a:extLst>
-          </a:blip>
-          <a:stretch>
-            <a:fillRect/>
-          </a:stretch>
-        </p:blipFill>
-        <p:spPr>
-          <a:xfrm>
-            <a:off x="747182" y="4112297"/>
-            <a:ext cx="4418179" cy="1979228"/>
-          </a:xfrm>
-          <a:prstGeom prst="rect">
-            <a:avLst/>
-          </a:prstGeom>
-        </p:spPr>
-      </p:pic>
-      <p:sp>
-        <p:nvSpPr>
-          <p:cNvPr id="77" name="Arc 76"/>
-          <p:cNvSpPr/>
-          <p:nvPr/>
-        </p:nvSpPr>
-        <p:spPr>
-          <a:xfrm>
-            <a:off x="5165361" y="3526499"/>
-            <a:ext cx="639322" cy="833872"/>
-          </a:xfrm>
-          <a:prstGeom prst="arc">
-            <a:avLst>
-              <a:gd name="adj1" fmla="val 19614026"/>
-              <a:gd name="adj2" fmla="val 7030606"/>
-            </a:avLst>
-          </a:prstGeom>
-          <a:ln>
-            <a:solidFill>
-              <a:schemeClr val="tx1"/>
-            </a:solidFill>
-          </a:ln>
-        </p:spPr>
-        <p:style>
-          <a:lnRef idx="2">
-            <a:schemeClr val="accent1"/>
-          </a:lnRef>
-          <a:fillRef idx="0">
-            <a:schemeClr val="accent1"/>
-          </a:fillRef>
-          <a:effectRef idx="1">
-            <a:schemeClr val="accent1"/>
-          </a:effectRef>
-          <a:fontRef idx="minor">
-            <a:schemeClr val="tx1"/>
-          </a:fontRef>
-        </p:style>
-        <p:txBody>
-          <a:bodyPr rtlCol="0" anchor="ctr"/>
-          <a:lstStyle/>
-          <a:p>
-            <a:pPr algn="ctr"/>
-            <a:endParaRPr lang="en-US"/>
-          </a:p>
-        </p:txBody>
-      </p:sp>
-      <p:sp>
-        <p:nvSpPr>
-          <p:cNvPr id="78" name="Arc 77"/>
-          <p:cNvSpPr/>
-          <p:nvPr/>
-        </p:nvSpPr>
-        <p:spPr>
-          <a:xfrm rot="9311364">
-            <a:off x="5285877" y="3988057"/>
-            <a:ext cx="847335" cy="760786"/>
-          </a:xfrm>
-          <a:prstGeom prst="arc">
-            <a:avLst>
-              <a:gd name="adj1" fmla="val 16200000"/>
-              <a:gd name="adj2" fmla="val 1587971"/>
-            </a:avLst>
-          </a:prstGeom>
-          <a:ln>
-            <a:solidFill>
-              <a:schemeClr val="tx1"/>
-            </a:solidFill>
-          </a:ln>
-        </p:spPr>
-        <p:style>
-          <a:lnRef idx="2">
-            <a:schemeClr val="accent1"/>
-          </a:lnRef>
-          <a:fillRef idx="0">
-            <a:schemeClr val="accent1"/>
-          </a:fillRef>
-          <a:effectRef idx="1">
-            <a:schemeClr val="accent1"/>
-          </a:effectRef>
-          <a:fontRef idx="minor">
-            <a:schemeClr val="tx1"/>
-          </a:fontRef>
-        </p:style>
-        <p:txBody>
-          <a:bodyPr rtlCol="0" anchor="ctr"/>
-          <a:lstStyle/>
-          <a:p>
-            <a:pPr algn="ctr"/>
-            <a:endParaRPr lang="en-US"/>
-          </a:p>
-        </p:txBody>
-      </p:sp>
-      <p:cxnSp>
-        <p:nvCxnSpPr>
-          <p:cNvPr id="24" name="Straight Arrow Connector 23"/>
-          <p:cNvCxnSpPr/>
-          <p:nvPr/>
-        </p:nvCxnSpPr>
-        <p:spPr>
-          <a:xfrm flipH="1" flipV="1">
-            <a:off x="4639735" y="4741335"/>
-            <a:ext cx="525626" cy="150178"/>
-          </a:xfrm>
-          <a:prstGeom prst="straightConnector1">
-            <a:avLst/>
-          </a:prstGeom>
-          <a:ln>
-            <a:solidFill>
-              <a:schemeClr val="tx1"/>
-            </a:solidFill>
-            <a:tailEnd type="arrow"/>
-          </a:ln>
-        </p:spPr>
-        <p:style>
-          <a:lnRef idx="2">
-            <a:schemeClr val="accent1"/>
-          </a:lnRef>
-          <a:fillRef idx="0">
-            <a:schemeClr val="accent1"/>
-          </a:fillRef>
-          <a:effectRef idx="1">
-            <a:schemeClr val="accent1"/>
-          </a:effectRef>
-          <a:fontRef idx="minor">
-            <a:schemeClr val="tx1"/>
-          </a:fontRef>
-        </p:style>
-      </p:cxnSp>
-      <p:sp>
-        <p:nvSpPr>
-          <p:cNvPr id="28" name="TextBox 27"/>
-          <p:cNvSpPr txBox="1"/>
-          <p:nvPr/>
-        </p:nvSpPr>
-        <p:spPr>
-          <a:xfrm>
-            <a:off x="5165361" y="4808314"/>
-            <a:ext cx="1037363" cy="369332"/>
-          </a:xfrm>
-          <a:prstGeom prst="rect">
-            <a:avLst/>
-          </a:prstGeom>
-          <a:noFill/>
-        </p:spPr>
-        <p:txBody>
-          <a:bodyPr wrap="square" rtlCol="0">
-            <a:spAutoFit/>
-          </a:bodyPr>
-          <a:lstStyle/>
-          <a:p>
-            <a:r>
-              <a:rPr lang="en-US" dirty="0" smtClean="0">
-                <a:latin typeface="Times"/>
-                <a:cs typeface="Times"/>
-              </a:rPr>
-              <a:t>Pivot</a:t>
-            </a:r>
-            <a:endParaRPr lang="en-US" dirty="0" smtClean="0">
-              <a:latin typeface="Times"/>
-              <a:cs typeface="Times"/>
-            </a:endParaRPr>
-          </a:p>
-        </p:txBody>
-      </p:sp>
-      <p:cxnSp>
-        <p:nvCxnSpPr>
-          <p:cNvPr id="29" name="Straight Arrow Connector 28"/>
-          <p:cNvCxnSpPr/>
-          <p:nvPr/>
-        </p:nvCxnSpPr>
-        <p:spPr>
-          <a:xfrm flipH="1" flipV="1">
-            <a:off x="4148667" y="4393878"/>
-            <a:ext cx="491068" cy="1040321"/>
-          </a:xfrm>
-          <a:prstGeom prst="straightConnector1">
-            <a:avLst/>
-          </a:prstGeom>
-          <a:ln>
-            <a:solidFill>
-              <a:schemeClr val="tx1"/>
-            </a:solidFill>
-            <a:tailEnd type="arrow"/>
-          </a:ln>
-        </p:spPr>
-        <p:style>
-          <a:lnRef idx="2">
-            <a:schemeClr val="accent1"/>
-          </a:lnRef>
-          <a:fillRef idx="0">
-            <a:schemeClr val="accent1"/>
-          </a:fillRef>
-          <a:effectRef idx="1">
-            <a:schemeClr val="accent1"/>
-          </a:effectRef>
-          <a:fontRef idx="minor">
-            <a:schemeClr val="tx1"/>
-          </a:fontRef>
-        </p:style>
-      </p:cxnSp>
-      <p:sp>
-        <p:nvSpPr>
-          <p:cNvPr id="33" name="TextBox 32"/>
-          <p:cNvSpPr txBox="1"/>
-          <p:nvPr/>
-        </p:nvSpPr>
-        <p:spPr>
-          <a:xfrm>
-            <a:off x="4639735" y="5406190"/>
-            <a:ext cx="2811752" cy="369332"/>
-          </a:xfrm>
-          <a:prstGeom prst="rect">
-            <a:avLst/>
-          </a:prstGeom>
-          <a:noFill/>
-        </p:spPr>
-        <p:txBody>
-          <a:bodyPr wrap="square" rtlCol="0">
-            <a:spAutoFit/>
-          </a:bodyPr>
-          <a:lstStyle/>
-          <a:p>
-            <a:r>
-              <a:rPr lang="en-US" dirty="0" smtClean="0">
-                <a:latin typeface="Times"/>
-                <a:cs typeface="Times"/>
-              </a:rPr>
-              <a:t>Large-aspect-ratio rectangle</a:t>
+              <a:t>Object</a:t>
             </a:r>
             <a:endParaRPr lang="en-US" dirty="0" smtClean="0">
               <a:latin typeface="Times"/>
@@ -4049,7 +4985,7 @@
   <p:timing>
     <p:tnLst>
       <p:par>
-        <p:cTn xmlns:p14="http://schemas.microsoft.com/office/powerpoint/2010/main" id="1" dur="indefinite" restart="never" nodeType="tmRoot"/>
+        <p:cTn id="1" dur="indefinite" restart="never" nodeType="tmRoot"/>
       </p:par>
     </p:tnLst>
   </p:timing>

</xml_diff>